<commit_message>
Quick fix to the slides for lecture 9.
</commit_message>
<xml_diff>
--- a/lectures/lecture09/slides.pptx
+++ b/lectures/lecture09/slides.pptx
@@ -131,6 +131,11 @@
       </a:defRPr>
     </a:lvl9pPr>
   </p:defaultTextStyle>
+  <p:extLst>
+    <p:ext uri="{EFAFB233-063F-42B5-8137-9DF3F51BA10A}">
+      <p15:sldGuideLst xmlns:p15="http://schemas.microsoft.com/office/powerpoint/2012/main"/>
+    </p:ext>
+  </p:extLst>
 </p:presentation>
 </file>
 
@@ -6112,29 +6117,89 @@
       </p:sp>
       <p:sp>
         <p:nvSpPr>
-          <p:cNvPr id="3" name="Content Placeholder 2">
-            <a:extLst>
-              <a:ext uri="{FF2B5EF4-FFF2-40B4-BE49-F238E27FC236}">
-                <a16:creationId xmlns:a16="http://schemas.microsoft.com/office/drawing/2014/main" id="{E94E6473-D79E-4054-A4DA-C581D5A07E60}"/>
-              </a:ext>
-            </a:extLst>
-          </p:cNvPr>
-          <p:cNvSpPr>
-            <a:spLocks noGrp="1"/>
-          </p:cNvSpPr>
-          <p:nvPr>
-            <p:ph idx="1"/>
-          </p:nvPr>
-        </p:nvSpPr>
-        <p:spPr/>
-        <p:txBody>
-          <a:bodyPr/>
-          <a:lstStyle/>
-          <a:p>
-            <a:endParaRPr lang="en-GB"/>
-          </a:p>
-        </p:txBody>
-      </p:sp>
+          <p:cNvPr id="4" name="Content Placeholder 3">
+            <a:extLst>
+              <a:ext uri="{FF2B5EF4-FFF2-40B4-BE49-F238E27FC236}">
+                <a16:creationId xmlns:a16="http://schemas.microsoft.com/office/drawing/2014/main" id="{8169D023-C917-4D36-A675-8A5F6C496848}"/>
+              </a:ext>
+            </a:extLst>
+          </p:cNvPr>
+          <p:cNvSpPr>
+            <a:spLocks noGrp="1"/>
+          </p:cNvSpPr>
+          <p:nvPr>
+            <p:ph sz="half" idx="1"/>
+          </p:nvPr>
+        </p:nvSpPr>
+        <p:spPr/>
+        <p:txBody>
+          <a:bodyPr/>
+          <a:lstStyle/>
+          <a:p>
+            <a:pPr marL="0" indent="0">
+              <a:buNone/>
+            </a:pPr>
+            <a:r>
+              <a:rPr lang="en-GB" dirty="0"/>
+              <a:t>Agile Software Requirements by Dean Leffingwell.</a:t>
+            </a:r>
+          </a:p>
+          <a:p>
+            <a:pPr marL="0" indent="0">
+              <a:buNone/>
+            </a:pPr>
+            <a:endParaRPr lang="en-GB" dirty="0"/>
+          </a:p>
+          <a:p>
+            <a:pPr marL="0" indent="0">
+              <a:buNone/>
+            </a:pPr>
+            <a:r>
+              <a:rPr lang="en-GB" dirty="0"/>
+              <a:t>Goes in depth from organisational to team level in the use of agile and requirements via </a:t>
+            </a:r>
+            <a:r>
+              <a:rPr lang="en-GB"/>
+              <a:t>user stories.</a:t>
+            </a:r>
+          </a:p>
+        </p:txBody>
+      </p:sp>
+      <p:pic>
+        <p:nvPicPr>
+          <p:cNvPr id="7" name="Content Placeholder 6">
+            <a:extLst>
+              <a:ext uri="{FF2B5EF4-FFF2-40B4-BE49-F238E27FC236}">
+                <a16:creationId xmlns:a16="http://schemas.microsoft.com/office/drawing/2014/main" id="{0849D1F2-63F3-452C-8608-E03F178050BE}"/>
+              </a:ext>
+            </a:extLst>
+          </p:cNvPr>
+          <p:cNvPicPr>
+            <a:picLocks noGrp="1" noChangeAspect="1"/>
+          </p:cNvPicPr>
+          <p:nvPr>
+            <p:ph sz="half" idx="2"/>
+          </p:nvPr>
+        </p:nvPicPr>
+        <p:blipFill>
+          <a:blip r:embed="rId2">
+            <a:extLst>
+              <a:ext uri="{28A0092B-C50C-407E-A947-70E740481C1C}">
+                <a14:useLocalDpi xmlns:a14="http://schemas.microsoft.com/office/drawing/2010/main" val="0"/>
+              </a:ext>
+            </a:extLst>
+          </a:blip>
+          <a:stretch>
+            <a:fillRect/>
+          </a:stretch>
+        </p:blipFill>
+        <p:spPr>
+          <a:xfrm>
+            <a:off x="7106178" y="1825625"/>
+            <a:ext cx="3313644" cy="4351338"/>
+          </a:xfrm>
+        </p:spPr>
+      </p:pic>
     </p:spTree>
     <p:extLst>
       <p:ext uri="{BB962C8B-B14F-4D97-AF65-F5344CB8AC3E}">

</xml_diff>